<commit_message>
updated communication slide as Mitch suggested
</commit_message>
<xml_diff>
--- a/Slides/Module 01.1 Course Introduction.pptx
+++ b/Slides/Module 01.1 Course Introduction.pptx
@@ -11058,15 +11058,9 @@
         </p:spPr>
         <p:txBody>
           <a:bodyPr>
-            <a:normAutofit/>
+            <a:normAutofit fontScale="92500" lnSpcReduction="10000"/>
           </a:bodyPr>
           <a:lstStyle/>
-          <a:p>
-            <a:r>
-              <a:rPr lang="en-US" dirty="0"/>
-              <a:t>Canvas</a:t>
-            </a:r>
-          </a:p>
           <a:p>
             <a:r>
               <a:rPr lang="en-US" dirty="0"/>
@@ -11086,8 +11080,12 @@
           <a:p>
             <a:pPr lvl="1"/>
             <a:r>
-              <a:rPr lang="en-US" dirty="0"/>
-              <a:t>Canvas will mirror the course web site. </a:t>
+              <a:rPr lang="en-US" b="1" dirty="0"/>
+              <a:t>Canvas</a:t>
+            </a:r>
+            <a:r>
+              <a:rPr lang="en-US" dirty="0"/>
+              <a:t> will mirror the course web site. </a:t>
             </a:r>
           </a:p>
           <a:p>
@@ -11107,7 +11105,20 @@
             <a:pPr lvl="1"/>
             <a:r>
               <a:rPr lang="en-US" dirty="0"/>
-              <a:t>for questions about assignments, projects, etc.</a:t>
+              <a:t>Questions about content, policies, assignments, projects, etc. are better asked on Piazza, so everybody gets the same answers.</a:t>
+            </a:r>
+          </a:p>
+          <a:p>
+            <a:r>
+              <a:rPr lang="en-US" dirty="0"/>
+              <a:t>Contacting the Instructor</a:t>
+            </a:r>
+          </a:p>
+          <a:p>
+            <a:pPr lvl="1"/>
+            <a:r>
+              <a:rPr lang="en-US" dirty="0"/>
+              <a:t>For private questions about your individual situation, please email the instructor directly (do NOT use Canvas messages – they may not get through to the instructor)</a:t>
             </a:r>
           </a:p>
           <a:p>
@@ -11140,27 +11151,9 @@
               <a:t>TA Office Hours are held via </a:t>
             </a:r>
             <a:r>
-              <a:rPr lang="en-US" b="1" dirty="0">
-                <a:hlinkClick r:id="rId4">
-                  <a:extLst>
-                    <a:ext uri="{A12FA001-AC4F-418D-AE19-62706E023703}">
-                      <ahyp:hlinkClr xmlns:ahyp="http://schemas.microsoft.com/office/drawing/2018/hyperlinkcolor" val="tx"/>
-                    </a:ext>
-                  </a:extLst>
-                </a:hlinkClick>
-              </a:rPr>
+              <a:rPr lang="en-US" b="1" dirty="0"/>
               <a:t>Khoury Office Hours App</a:t>
             </a:r>
-            <a:endParaRPr lang="en-US" dirty="0"/>
-          </a:p>
-          <a:p>
-            <a:pPr lvl="1"/>
-            <a:endParaRPr lang="en-US" dirty="0"/>
-          </a:p>
-          <a:p>
-            <a:pPr marL="0" indent="0">
-              <a:buNone/>
-            </a:pPr>
             <a:endParaRPr lang="en-US" dirty="0"/>
           </a:p>
         </p:txBody>
@@ -13305,7 +13298,7 @@
           </a:ln>
           <a:extLst>
             <a:ext uri="{C572A759-6A51-4108-AA02-DFA0A04FC94B}">
-              <ma14:wrappingTextBoxFlag xmlns="" xmlns:m="http://schemas.openxmlformats.org/officeDocument/2006/math" xmlns:a14="http://schemas.microsoft.com/office/drawing/2010/main" xmlns:ma14="http://schemas.microsoft.com/office/mac/drawingml/2011/main" val="1"/>
+              <ma14:wrappingTextBoxFlag xmlns:ma14="http://schemas.microsoft.com/office/mac/drawingml/2011/main" xmlns:a14="http://schemas.microsoft.com/office/drawing/2010/main" xmlns:m="http://schemas.openxmlformats.org/officeDocument/2006/math" xmlns="" val="1"/>
             </a:ext>
           </a:extLst>
         </p:spPr>
@@ -13366,7 +13359,7 @@
           </a:ln>
           <a:extLst>
             <a:ext uri="{C572A759-6A51-4108-AA02-DFA0A04FC94B}">
-              <ma14:wrappingTextBoxFlag xmlns="" xmlns:m="http://schemas.openxmlformats.org/officeDocument/2006/math" xmlns:a14="http://schemas.microsoft.com/office/drawing/2010/main" xmlns:ma14="http://schemas.microsoft.com/office/mac/drawingml/2011/main" val="1"/>
+              <ma14:wrappingTextBoxFlag xmlns:ma14="http://schemas.microsoft.com/office/mac/drawingml/2011/main" xmlns:a14="http://schemas.microsoft.com/office/drawing/2010/main" xmlns:m="http://schemas.openxmlformats.org/officeDocument/2006/math" xmlns="" val="1"/>
             </a:ext>
           </a:extLst>
         </p:spPr>

</xml_diff>